<commit_message>
week 6 project completed
</commit_message>
<xml_diff>
--- a/GNCIPL Project ppt.pptx
+++ b/GNCIPL Project ppt.pptx
@@ -7823,7 +7823,7 @@
                   <a:cs typeface="Arimo Bold"/>
                   <a:sym typeface="Arimo Bold"/>
                 </a:rPr>
-                <a:t>12</a:t>
+                <a:t>13</a:t>
               </a:r>
             </a:p>
           </p:txBody>
@@ -8229,10 +8229,10 @@
         </p:nvGrpSpPr>
         <p:grpSpPr>
           <a:xfrm rot="0">
-            <a:off x="6846102" y="3651535"/>
-            <a:ext cx="4595797" cy="2983930"/>
+            <a:off x="6497013" y="3835830"/>
+            <a:ext cx="5293975" cy="2615340"/>
             <a:chOff x="0" y="0"/>
-            <a:chExt cx="4414630" cy="2866304"/>
+            <a:chExt cx="5801975" cy="2866304"/>
           </a:xfrm>
         </p:grpSpPr>
         <p:sp>
@@ -8244,7 +8244,7 @@
           <p:spPr>
             <a:xfrm flipH="false" flipV="false" rot="0">
               <a:off x="0" y="0"/>
-              <a:ext cx="4414630" cy="2866304"/>
+              <a:ext cx="5801975" cy="2866304"/>
             </a:xfrm>
             <a:custGeom>
               <a:avLst/>
@@ -8253,15 +8253,15 @@
               <a:cxnLst/>
               <a:rect r="r" b="b" t="t" l="l"/>
               <a:pathLst>
-                <a:path h="2866304" w="4414630">
+                <a:path h="2866304" w="5801975">
                   <a:moveTo>
                     <a:pt x="0" y="0"/>
                   </a:moveTo>
                   <a:lnTo>
-                    <a:pt x="4414630" y="0"/>
+                    <a:pt x="5801975" y="0"/>
                   </a:lnTo>
                   <a:lnTo>
-                    <a:pt x="4414630" y="2866304"/>
+                    <a:pt x="5801975" y="2866304"/>
                   </a:lnTo>
                   <a:lnTo>
                     <a:pt x="0" y="2866304"/>
@@ -8285,8 +8285,8 @@
           </p:nvSpPr>
           <p:spPr>
             <a:xfrm>
-              <a:off x="0" y="-123825"/>
-              <a:ext cx="4414630" cy="2990129"/>
+              <a:off x="0" y="-152400"/>
+              <a:ext cx="5801975" cy="3018704"/>
             </a:xfrm>
             <a:prstGeom prst="rect">
               <a:avLst/>
@@ -8298,11 +8298,11 @@
             <a:p>
               <a:pPr algn="l">
                 <a:lnSpc>
-                  <a:spcPts val="7439"/>
+                  <a:spcPts val="9599"/>
                 </a:lnSpc>
               </a:pPr>
               <a:r>
-                <a:rPr lang="en-US" sz="6199">
+                <a:rPr lang="en-US" sz="7999">
                   <a:solidFill>
                     <a:srgbClr val="775F55"/>
                   </a:solidFill>
@@ -8640,7 +8640,19 @@
                 <a:cs typeface="Times New Roman MT"/>
                 <a:sym typeface="Times New Roman MT"/>
               </a:rPr>
-              <a:t>Technologies Used</a:t>
+              <a:t>Real-Time D</a:t>
+            </a:r>
+            <a:r>
+              <a:rPr lang="en-US" sz="2507">
+                <a:solidFill>
+                  <a:srgbClr val="000000"/>
+                </a:solidFill>
+                <a:latin typeface="Times New Roman MT"/>
+                <a:ea typeface="Times New Roman MT"/>
+                <a:cs typeface="Times New Roman MT"/>
+                <a:sym typeface="Times New Roman MT"/>
+              </a:rPr>
+              <a:t>etection Pipeline</a:t>
             </a:r>
           </a:p>
           <a:p>
@@ -8668,7 +8680,7 @@
                 <a:cs typeface="Times New Roman MT"/>
                 <a:sym typeface="Times New Roman MT"/>
               </a:rPr>
-              <a:t>Real-Time D</a:t>
+              <a:t>Securi</a:t>
             </a:r>
             <a:r>
               <a:rPr lang="en-US" sz="2507">
@@ -8680,7 +8692,7 @@
                 <a:cs typeface="Times New Roman MT"/>
                 <a:sym typeface="Times New Roman MT"/>
               </a:rPr>
-              <a:t>etection Pipeline</a:t>
+              <a:t>ty &amp; Compliance</a:t>
             </a:r>
           </a:p>
           <a:p>
@@ -8708,7 +8720,7 @@
                 <a:cs typeface="Times New Roman MT"/>
                 <a:sym typeface="Times New Roman MT"/>
               </a:rPr>
-              <a:t>Securi</a:t>
+              <a:t>Co</a:t>
             </a:r>
             <a:r>
               <a:rPr lang="en-US" sz="2507">
@@ -8720,7 +8732,7 @@
                 <a:cs typeface="Times New Roman MT"/>
                 <a:sym typeface="Times New Roman MT"/>
               </a:rPr>
-              <a:t>ty &amp; Compliance</a:t>
+              <a:t>mpetitive Advantage</a:t>
             </a:r>
           </a:p>
           <a:p>
@@ -8731,36 +8743,36 @@
             </a:pPr>
           </a:p>
           <a:p>
-            <a:pPr algn="l" marL="453855" indent="-226928" lvl="1">
-              <a:lnSpc>
-                <a:spcPts val="2407"/>
+            <a:pPr algn="l" marL="463115" indent="-231558" lvl="1">
+              <a:lnSpc>
+                <a:spcPts val="2456"/>
               </a:lnSpc>
               <a:buFont typeface="Arial"/>
               <a:buChar char="•"/>
             </a:pPr>
             <a:r>
-              <a:rPr lang="en-US" sz="2507">
-                <a:solidFill>
-                  <a:srgbClr val="000000"/>
-                </a:solidFill>
-                <a:latin typeface="Times New Roman MT"/>
-                <a:ea typeface="Times New Roman MT"/>
-                <a:cs typeface="Times New Roman MT"/>
-                <a:sym typeface="Times New Roman MT"/>
-              </a:rPr>
-              <a:t>Co</a:t>
-            </a:r>
-            <a:r>
-              <a:rPr lang="en-US" sz="2507">
-                <a:solidFill>
-                  <a:srgbClr val="000000"/>
-                </a:solidFill>
-                <a:latin typeface="Times New Roman MT"/>
-                <a:ea typeface="Times New Roman MT"/>
-                <a:cs typeface="Times New Roman MT"/>
-                <a:sym typeface="Times New Roman MT"/>
-              </a:rPr>
-              <a:t>mpetitive Advantage</a:t>
+              <a:rPr lang="en-US" sz="2558">
+                <a:solidFill>
+                  <a:srgbClr val="000000"/>
+                </a:solidFill>
+                <a:latin typeface="Times New Roman MT"/>
+                <a:ea typeface="Times New Roman MT"/>
+                <a:cs typeface="Times New Roman MT"/>
+                <a:sym typeface="Times New Roman MT"/>
+              </a:rPr>
+              <a:t>Use </a:t>
+            </a:r>
+            <a:r>
+              <a:rPr lang="en-US" sz="2558">
+                <a:solidFill>
+                  <a:srgbClr val="000000"/>
+                </a:solidFill>
+                <a:latin typeface="Times New Roman MT"/>
+                <a:ea typeface="Times New Roman MT"/>
+                <a:cs typeface="Times New Roman MT"/>
+                <a:sym typeface="Times New Roman MT"/>
+              </a:rPr>
+              <a:t>Cases</a:t>
             </a:r>
           </a:p>
           <a:p>
@@ -8788,7 +8800,7 @@
                 <a:cs typeface="Times New Roman MT"/>
                 <a:sym typeface="Times New Roman MT"/>
               </a:rPr>
-              <a:t>Use </a:t>
+              <a:t>W</a:t>
             </a:r>
             <a:r>
               <a:rPr lang="en-US" sz="2558">
@@ -8800,7 +8812,7 @@
                 <a:cs typeface="Times New Roman MT"/>
                 <a:sym typeface="Times New Roman MT"/>
               </a:rPr>
-              <a:t>Cases</a:t>
+              <a:t>eb Application</a:t>
             </a:r>
           </a:p>
           <a:p>
@@ -8828,7 +8840,7 @@
                 <a:cs typeface="Times New Roman MT"/>
                 <a:sym typeface="Times New Roman MT"/>
               </a:rPr>
-              <a:t>W</a:t>
+              <a:t>Business</a:t>
             </a:r>
             <a:r>
               <a:rPr lang="en-US" sz="2558">
@@ -8840,13 +8852,13 @@
                 <a:cs typeface="Times New Roman MT"/>
                 <a:sym typeface="Times New Roman MT"/>
               </a:rPr>
-              <a:t>eb Application</a:t>
+              <a:t> Impact</a:t>
             </a:r>
           </a:p>
           <a:p>
             <a:pPr algn="l">
               <a:lnSpc>
-                <a:spcPts val="1102"/>
+                <a:spcPts val="1103"/>
               </a:lnSpc>
             </a:pPr>
           </a:p>
@@ -8868,19 +8880,7 @@
                 <a:cs typeface="Times New Roman MT"/>
                 <a:sym typeface="Times New Roman MT"/>
               </a:rPr>
-              <a:t>Business</a:t>
-            </a:r>
-            <a:r>
-              <a:rPr lang="en-US" sz="2558">
-                <a:solidFill>
-                  <a:srgbClr val="000000"/>
-                </a:solidFill>
-                <a:latin typeface="Times New Roman MT"/>
-                <a:ea typeface="Times New Roman MT"/>
-                <a:cs typeface="Times New Roman MT"/>
-                <a:sym typeface="Times New Roman MT"/>
-              </a:rPr>
-              <a:t> Impact</a:t>
+              <a:t>Implementation Strategy</a:t>
             </a:r>
           </a:p>
           <a:p>
@@ -8908,7 +8908,7 @@
                 <a:cs typeface="Times New Roman MT"/>
                 <a:sym typeface="Times New Roman MT"/>
               </a:rPr>
-              <a:t>Implementation Strategy</a:t>
+              <a:t>Conclusion</a:t>
             </a:r>
           </a:p>
         </p:txBody>

</xml_diff>